<commit_message>
Small changes to course3.pptx
</commit_message>
<xml_diff>
--- a/ClassSlides/Course3.pptx
+++ b/ClassSlides/Course3.pptx
@@ -3503,7 +3503,7 @@
             </a:pPr>
             <a:r>
               <a:rPr lang="en-US" dirty="0"/>
-              <a:t>Investment decision-making</a:t>
+              <a:t>Investment decision making</a:t>
             </a:r>
           </a:p>
           <a:p>
@@ -3542,23 +3542,13 @@
             </a:r>
             <a:r>
               <a:rPr lang="en-US" dirty="0"/>
-              <a:t> users guide</a:t>
-            </a:r>
-            <a:r>
-              <a:rPr lang="en-US"/>
-              <a:t>:          </a:t>
-            </a:r>
-            <a:r>
-              <a:rPr lang="en-US">
-                <a:hlinkClick r:id="rId2"/>
-              </a:rPr>
-              <a:t>https</a:t>
+              <a:t> users guide:          </a:t>
             </a:r>
             <a:r>
               <a:rPr lang="en-US" dirty="0">
                 <a:hlinkClick r:id="rId2"/>
               </a:rPr>
-              <a:t>://www.gams.com/fileadmin/community/contrib/doc/mccarlgamsuserguide.pdf</a:t>
+              <a:t>https://www.gams.com/fileadmin/community/contrib/doc/mccarlgamsuserguide.pdf</a:t>
             </a:r>
             <a:endParaRPr lang="en-US" dirty="0"/>
           </a:p>
@@ -3645,7 +3635,7 @@
           <a:p>
             <a:r>
               <a:rPr lang="en-US" dirty="0"/>
-              <a:t>Theory of optimization – can vote on this</a:t>
+              <a:t>(Brief) theory of optimization – We can vote on this</a:t>
             </a:r>
           </a:p>
           <a:p>
@@ -3683,6 +3673,13 @@
             <a:pPr lvl="1"/>
             <a:r>
               <a:rPr lang="en-US" dirty="0"/>
+              <a:t>Dealing with outputs in R</a:t>
+            </a:r>
+          </a:p>
+          <a:p>
+            <a:pPr lvl="1"/>
+            <a:r>
+              <a:rPr lang="en-US" dirty="0"/>
               <a:t>Using the command prompt, creating .bat/.</a:t>
             </a:r>
             <a:r>
@@ -3692,13 +3689,6 @@
             <a:r>
               <a:rPr lang="en-US" dirty="0"/>
               <a:t> files</a:t>
-            </a:r>
-          </a:p>
-          <a:p>
-            <a:pPr lvl="1"/>
-            <a:r>
-              <a:rPr lang="en-US" dirty="0"/>
-              <a:t>Dealing with outputs in R</a:t>
             </a:r>
           </a:p>
           <a:p>
@@ -23056,6 +23046,21 @@
 </file>
 
 <file path=customXml/item1.xml><?xml version="1.0" encoding="utf-8"?>
+<p:properties xmlns:p="http://schemas.microsoft.com/office/2006/metadata/properties" xmlns:xsi="http://www.w3.org/2001/XMLSchema-instance" xmlns:pc="http://schemas.microsoft.com/office/infopath/2007/PartnerControls">
+  <documentManagement/>
+</p:properties>
+</file>
+
+<file path=customXml/item2.xml><?xml version="1.0" encoding="utf-8"?>
+<?mso-contentType ?>
+<FormTemplates xmlns="http://schemas.microsoft.com/sharepoint/v3/contenttype/forms">
+  <Display>DocumentLibraryForm</Display>
+  <Edit>DocumentLibraryForm</Edit>
+  <New>DocumentLibraryForm</New>
+</FormTemplates>
+</file>
+
+<file path=customXml/item3.xml><?xml version="1.0" encoding="utf-8"?>
 <ct:contentTypeSchema xmlns:ct="http://schemas.microsoft.com/office/2006/metadata/contentType" xmlns:ma="http://schemas.microsoft.com/office/2006/metadata/properties/metaAttributes" ct:_="" ma:_="" ma:contentTypeName="Document" ma:contentTypeID="0x01010053E2693203405740801F7909708B9EC8" ma:contentTypeVersion="5" ma:contentTypeDescription="Create a new document." ma:contentTypeScope="" ma:versionID="3cc64ba863a136717d98f4cadf623a68">
   <xsd:schema xmlns:xsd="http://www.w3.org/2001/XMLSchema" xmlns:xs="http://www.w3.org/2001/XMLSchema" xmlns:p="http://schemas.microsoft.com/office/2006/metadata/properties" xmlns:ns3="780ef8cb-f8f0-4b28-995f-37deb65e31ee" xmlns:ns4="e1302021-5d63-4075-b4cc-40354b0dcffd" targetNamespace="http://schemas.microsoft.com/office/2006/metadata/properties" ma:root="true" ma:fieldsID="9e9b218546a662db9583a9e010d8a944" ns3:_="" ns4:_="">
     <xsd:import namespace="780ef8cb-f8f0-4b28-995f-37deb65e31ee"/>
@@ -23226,22 +23231,32 @@
 </ct:contentTypeSchema>
 </file>
 
-<file path=customXml/item2.xml><?xml version="1.0" encoding="utf-8"?>
-<?mso-contentType ?>
-<FormTemplates xmlns="http://schemas.microsoft.com/sharepoint/v3/contenttype/forms">
-  <Display>DocumentLibraryForm</Display>
-  <Edit>DocumentLibraryForm</Edit>
-  <New>DocumentLibraryForm</New>
-</FormTemplates>
+<file path=customXml/itemProps1.xml><?xml version="1.0" encoding="utf-8"?>
+<ds:datastoreItem xmlns:ds="http://schemas.openxmlformats.org/officeDocument/2006/customXml" ds:itemID="{F9F92D47-1E07-44F0-8B8A-1B18DEF96C1F}">
+  <ds:schemaRefs>
+    <ds:schemaRef ds:uri="http://purl.org/dc/terms/"/>
+    <ds:schemaRef ds:uri="http://schemas.openxmlformats.org/package/2006/metadata/core-properties"/>
+    <ds:schemaRef ds:uri="http://schemas.microsoft.com/office/2006/documentManagement/types"/>
+    <ds:schemaRef ds:uri="http://schemas.microsoft.com/office/infopath/2007/PartnerControls"/>
+    <ds:schemaRef ds:uri="http://purl.org/dc/elements/1.1/"/>
+    <ds:schemaRef ds:uri="http://schemas.microsoft.com/office/2006/metadata/properties"/>
+    <ds:schemaRef ds:uri="e1302021-5d63-4075-b4cc-40354b0dcffd"/>
+    <ds:schemaRef ds:uri="780ef8cb-f8f0-4b28-995f-37deb65e31ee"/>
+    <ds:schemaRef ds:uri="http://www.w3.org/XML/1998/namespace"/>
+    <ds:schemaRef ds:uri="http://purl.org/dc/dcmitype/"/>
+  </ds:schemaRefs>
+</ds:datastoreItem>
 </file>
 
-<file path=customXml/item3.xml><?xml version="1.0" encoding="utf-8"?>
-<p:properties xmlns:p="http://schemas.microsoft.com/office/2006/metadata/properties" xmlns:xsi="http://www.w3.org/2001/XMLSchema-instance" xmlns:pc="http://schemas.microsoft.com/office/infopath/2007/PartnerControls">
-  <documentManagement/>
-</p:properties>
+<file path=customXml/itemProps2.xml><?xml version="1.0" encoding="utf-8"?>
+<ds:datastoreItem xmlns:ds="http://schemas.openxmlformats.org/officeDocument/2006/customXml" ds:itemID="{3DFFDB76-D8F0-40C1-A211-D3AD37A91750}">
+  <ds:schemaRefs>
+    <ds:schemaRef ds:uri="http://schemas.microsoft.com/sharepoint/v3/contenttype/forms"/>
+  </ds:schemaRefs>
+</ds:datastoreItem>
 </file>
 
-<file path=customXml/itemProps1.xml><?xml version="1.0" encoding="utf-8"?>
+<file path=customXml/itemProps3.xml><?xml version="1.0" encoding="utf-8"?>
 <ds:datastoreItem xmlns:ds="http://schemas.openxmlformats.org/officeDocument/2006/customXml" ds:itemID="{7342E5A7-CEBE-4331-8B53-9BEC012B837A}">
   <ds:schemaRefs>
     <ds:schemaRef ds:uri="http://schemas.microsoft.com/office/2006/metadata/contentType"/>
@@ -23258,29 +23273,4 @@
     <ds:schemaRef ds:uri="http://schemas.microsoft.com/internal/obd"/>
   </ds:schemaRefs>
 </ds:datastoreItem>
-</file>
-
-<file path=customXml/itemProps2.xml><?xml version="1.0" encoding="utf-8"?>
-<ds:datastoreItem xmlns:ds="http://schemas.openxmlformats.org/officeDocument/2006/customXml" ds:itemID="{3DFFDB76-D8F0-40C1-A211-D3AD37A91750}">
-  <ds:schemaRefs>
-    <ds:schemaRef ds:uri="http://schemas.microsoft.com/sharepoint/v3/contenttype/forms"/>
-  </ds:schemaRefs>
-</ds:datastoreItem>
-</file>
-
-<file path=customXml/itemProps3.xml><?xml version="1.0" encoding="utf-8"?>
-<ds:datastoreItem xmlns:ds="http://schemas.openxmlformats.org/officeDocument/2006/customXml" ds:itemID="{F9F92D47-1E07-44F0-8B8A-1B18DEF96C1F}">
-  <ds:schemaRefs>
-    <ds:schemaRef ds:uri="http://purl.org/dc/terms/"/>
-    <ds:schemaRef ds:uri="http://schemas.openxmlformats.org/package/2006/metadata/core-properties"/>
-    <ds:schemaRef ds:uri="http://schemas.microsoft.com/office/2006/documentManagement/types"/>
-    <ds:schemaRef ds:uri="http://schemas.microsoft.com/office/infopath/2007/PartnerControls"/>
-    <ds:schemaRef ds:uri="http://purl.org/dc/elements/1.1/"/>
-    <ds:schemaRef ds:uri="http://schemas.microsoft.com/office/2006/metadata/properties"/>
-    <ds:schemaRef ds:uri="e1302021-5d63-4075-b4cc-40354b0dcffd"/>
-    <ds:schemaRef ds:uri="780ef8cb-f8f0-4b28-995f-37deb65e31ee"/>
-    <ds:schemaRef ds:uri="http://www.w3.org/XML/1998/namespace"/>
-    <ds:schemaRef ds:uri="http://purl.org/dc/dcmitype/"/>
-  </ds:schemaRefs>
-</ds:datastoreItem>
 </file>
</xml_diff>

<commit_message>
Smaller changes to course3.pptx
</commit_message>
<xml_diff>
--- a/ClassSlides/Course3.pptx
+++ b/ClassSlides/Course3.pptx
@@ -3502,8 +3502,12 @@
               <a:buAutoNum type="arabicPeriod"/>
             </a:pPr>
             <a:r>
+              <a:rPr lang="en-US"/>
+              <a:t>Investment </a:t>
+            </a:r>
+            <a:r>
               <a:rPr lang="en-US" dirty="0"/>
-              <a:t>Investment decision making</a:t>
+              <a:t>decision making</a:t>
             </a:r>
           </a:p>
           <a:p>

</xml_diff>